<commit_message>
updates to powerpoint templates
- replaced Robarts picture with picture of WIRB for BMI templates
- ungrouped acknowledgement logos to enable easier ability to change/move around logos
- removed OGS templates (to be added in by user if need be)
</commit_message>
<xml_diff>
--- a/Presentations/Khanlab_Robarts_BMI_ppt_template_16x9.pptx
+++ b/Presentations/Khanlab_Robarts_BMI_ppt_template_16x9.pptx
@@ -236,6 +236,18 @@
 </p:presentation>
 </file>
 
+<file path=ppt/commentAuthors.xml><?xml version="1.0" encoding="utf-8"?>
+<p:cmAuthorLst xmlns:a="http://schemas.openxmlformats.org/drawingml/2006/main" xmlns:r="http://schemas.openxmlformats.org/officeDocument/2006/relationships" xmlns:p="http://schemas.openxmlformats.org/presentationml/2006/main">
+  <p:cmAuthor id="1" name="Jason Tzu Chieh Kai" initials="JTCK" lastIdx="1" clrIdx="0">
+    <p:extLst>
+      <p:ext uri="{19B8F6BF-5375-455C-9EA6-DF929625EA0E}">
+        <p15:presenceInfo xmlns:p15="http://schemas.microsoft.com/office/powerpoint/2012/main" userId="Jason Tzu Chieh Kai" providerId="None"/>
+      </p:ext>
+    </p:extLst>
+  </p:cmAuthor>
+</p:cmAuthorLst>
+</file>
+
 <file path=ppt/notesMasters/notesMaster1.xml><?xml version="1.0" encoding="utf-8"?>
 <p:notesMaster xmlns:a="http://schemas.openxmlformats.org/drawingml/2006/main" xmlns:r="http://schemas.openxmlformats.org/officeDocument/2006/relationships" xmlns:p="http://schemas.openxmlformats.org/presentationml/2006/main">
   <p:cSld>
@@ -548,11 +560,11 @@
           <a:lstStyle/>
           <a:p>
             <a:r>
-              <a:rPr lang="en-CA" dirty="0" smtClean="0"/>
+              <a:rPr lang="en-CA" dirty="0"/>
               <a:t>General</a:t>
             </a:r>
             <a:r>
-              <a:rPr lang="en-CA" baseline="0" dirty="0" smtClean="0"/>
+              <a:rPr lang="en-CA" baseline="0" dirty="0"/>
               <a:t> point: break down figures a bit more</a:t>
             </a:r>
             <a:endParaRPr lang="en-CA" dirty="0"/>
@@ -637,7 +649,7 @@
               <a:rPr lang="en-US" baseline="0" smtClean="0"/>
               <a:t>2</a:t>
             </a:fld>
-            <a:endParaRPr lang="en-US" baseline="0" dirty="0" smtClean="0"/>
+            <a:endParaRPr lang="en-US" baseline="0" dirty="0"/>
           </a:p>
         </p:txBody>
       </p:sp>
@@ -750,7 +762,7 @@
               <a:rPr lang="en-US" baseline="0" smtClean="0"/>
               <a:t>3</a:t>
             </a:fld>
-            <a:endParaRPr lang="en-US" baseline="0" dirty="0" smtClean="0"/>
+            <a:endParaRPr lang="en-US" baseline="0" dirty="0"/>
           </a:p>
         </p:txBody>
       </p:sp>
@@ -876,7 +888,7 @@
           </a:lstStyle>
           <a:p>
             <a:r>
-              <a:rPr lang="en-US" smtClean="0"/>
+              <a:rPr lang="en-US"/>
               <a:t>Click to edit Master title style</a:t>
             </a:r>
             <a:endParaRPr lang="en-CA" dirty="0"/>
@@ -947,7 +959,7 @@
           </a:lstStyle>
           <a:p>
             <a:r>
-              <a:rPr lang="en-US" smtClean="0"/>
+              <a:rPr lang="en-US"/>
               <a:t>Click to edit Master subtitle style</a:t>
             </a:r>
             <a:endParaRPr lang="en-CA"/>
@@ -956,22 +968,22 @@
       </p:sp>
       <p:pic>
         <p:nvPicPr>
-          <p:cNvPr id="1262601" name="Picture 9" descr="RRI_Photo"/>
+          <p:cNvPr id="1262601" name="Picture 9"/>
           <p:cNvPicPr>
             <a:picLocks noChangeAspect="1" noChangeArrowheads="1"/>
           </p:cNvPicPr>
           <p:nvPr/>
         </p:nvPicPr>
         <p:blipFill>
-          <a:blip r:embed="rId2" cstate="print"/>
+          <a:blip r:embed="rId2"/>
           <a:stretch>
             <a:fillRect/>
           </a:stretch>
         </p:blipFill>
         <p:spPr bwMode="auto">
           <a:xfrm>
-            <a:off x="3097185" y="183805"/>
-            <a:ext cx="5997633" cy="3981796"/>
+            <a:off x="3441471" y="183805"/>
+            <a:ext cx="5309061" cy="3981796"/>
           </a:xfrm>
           <a:prstGeom prst="rect">
             <a:avLst/>
@@ -1111,13 +1123,6 @@
   <p:clrMapOvr>
     <a:masterClrMapping/>
   </p:clrMapOvr>
-  <p:timing>
-    <p:tnLst>
-      <p:par>
-        <p:cTn id="1" dur="indefinite" restart="never" nodeType="tmRoot"/>
-      </p:par>
-    </p:tnLst>
-  </p:timing>
 </p:sldLayout>
 </file>
 
@@ -1154,7 +1159,7 @@
           <a:lstStyle/>
           <a:p>
             <a:r>
-              <a:rPr lang="en-US" smtClean="0"/>
+              <a:rPr lang="en-US"/>
               <a:t>Click to edit Master title style</a:t>
             </a:r>
             <a:endParaRPr lang="en-CA"/>
@@ -1178,35 +1183,35 @@
           <a:p>
             <a:pPr lvl="0"/>
             <a:r>
-              <a:rPr lang="en-US" smtClean="0"/>
+              <a:rPr lang="en-US"/>
               <a:t>Click to edit Master text styles</a:t>
             </a:r>
           </a:p>
           <a:p>
             <a:pPr lvl="1"/>
             <a:r>
-              <a:rPr lang="en-US" smtClean="0"/>
+              <a:rPr lang="en-US"/>
               <a:t>Second level</a:t>
             </a:r>
           </a:p>
           <a:p>
             <a:pPr lvl="2"/>
             <a:r>
-              <a:rPr lang="en-US" smtClean="0"/>
+              <a:rPr lang="en-US"/>
               <a:t>Third level</a:t>
             </a:r>
           </a:p>
           <a:p>
             <a:pPr lvl="3"/>
             <a:r>
-              <a:rPr lang="en-US" smtClean="0"/>
+              <a:rPr lang="en-US"/>
               <a:t>Fourth level</a:t>
             </a:r>
           </a:p>
           <a:p>
             <a:pPr lvl="4"/>
             <a:r>
-              <a:rPr lang="en-US" smtClean="0"/>
+              <a:rPr lang="en-US"/>
               <a:t>Fifth level</a:t>
             </a:r>
             <a:endParaRPr lang="en-CA"/>
@@ -1318,13 +1323,6 @@
   <p:clrMapOvr>
     <a:masterClrMapping/>
   </p:clrMapOvr>
-  <p:timing>
-    <p:tnLst>
-      <p:par>
-        <p:cTn id="1" dur="indefinite" restart="never" nodeType="tmRoot"/>
-      </p:par>
-    </p:tnLst>
-  </p:timing>
 </p:sldLayout>
 </file>
 
@@ -1366,7 +1364,7 @@
           <a:lstStyle/>
           <a:p>
             <a:r>
-              <a:rPr lang="en-US" smtClean="0"/>
+              <a:rPr lang="en-US"/>
               <a:t>Click to edit Master title style</a:t>
             </a:r>
             <a:endParaRPr lang="en-CA"/>
@@ -1395,35 +1393,35 @@
           <a:p>
             <a:pPr lvl="0"/>
             <a:r>
-              <a:rPr lang="en-US" smtClean="0"/>
+              <a:rPr lang="en-US"/>
               <a:t>Click to edit Master text styles</a:t>
             </a:r>
           </a:p>
           <a:p>
             <a:pPr lvl="1"/>
             <a:r>
-              <a:rPr lang="en-US" smtClean="0"/>
+              <a:rPr lang="en-US"/>
               <a:t>Second level</a:t>
             </a:r>
           </a:p>
           <a:p>
             <a:pPr lvl="2"/>
             <a:r>
-              <a:rPr lang="en-US" smtClean="0"/>
+              <a:rPr lang="en-US"/>
               <a:t>Third level</a:t>
             </a:r>
           </a:p>
           <a:p>
             <a:pPr lvl="3"/>
             <a:r>
-              <a:rPr lang="en-US" smtClean="0"/>
+              <a:rPr lang="en-US"/>
               <a:t>Fourth level</a:t>
             </a:r>
           </a:p>
           <a:p>
             <a:pPr lvl="4"/>
             <a:r>
-              <a:rPr lang="en-US" smtClean="0"/>
+              <a:rPr lang="en-US"/>
               <a:t>Fifth level</a:t>
             </a:r>
             <a:endParaRPr lang="en-CA"/>
@@ -1535,13 +1533,6 @@
   <p:clrMapOvr>
     <a:masterClrMapping/>
   </p:clrMapOvr>
-  <p:timing>
-    <p:tnLst>
-      <p:par>
-        <p:cTn id="1" dur="indefinite" restart="never" nodeType="tmRoot"/>
-      </p:par>
-    </p:tnLst>
-  </p:timing>
 </p:sldLayout>
 </file>
 
@@ -1583,7 +1574,7 @@
           <a:lstStyle/>
           <a:p>
             <a:r>
-              <a:rPr lang="en-US" smtClean="0"/>
+              <a:rPr lang="en-US"/>
               <a:t>Click to edit Master title style</a:t>
             </a:r>
             <a:endParaRPr lang="en-CA"/>
@@ -1612,35 +1603,35 @@
           <a:p>
             <a:pPr lvl="0"/>
             <a:r>
-              <a:rPr lang="en-US" smtClean="0"/>
+              <a:rPr lang="en-US"/>
               <a:t>Click to edit Master text styles</a:t>
             </a:r>
           </a:p>
           <a:p>
             <a:pPr lvl="1"/>
             <a:r>
-              <a:rPr lang="en-US" smtClean="0"/>
+              <a:rPr lang="en-US"/>
               <a:t>Second level</a:t>
             </a:r>
           </a:p>
           <a:p>
             <a:pPr lvl="2"/>
             <a:r>
-              <a:rPr lang="en-US" smtClean="0"/>
+              <a:rPr lang="en-US"/>
               <a:t>Third level</a:t>
             </a:r>
           </a:p>
           <a:p>
             <a:pPr lvl="3"/>
             <a:r>
-              <a:rPr lang="en-US" smtClean="0"/>
+              <a:rPr lang="en-US"/>
               <a:t>Fourth level</a:t>
             </a:r>
           </a:p>
           <a:p>
             <a:pPr lvl="4"/>
             <a:r>
-              <a:rPr lang="en-US" smtClean="0"/>
+              <a:rPr lang="en-US"/>
               <a:t>Fifth level</a:t>
             </a:r>
             <a:endParaRPr lang="en-CA"/>
@@ -1669,35 +1660,35 @@
           <a:p>
             <a:pPr lvl="0"/>
             <a:r>
-              <a:rPr lang="en-US" smtClean="0"/>
+              <a:rPr lang="en-US"/>
               <a:t>Click to edit Master text styles</a:t>
             </a:r>
           </a:p>
           <a:p>
             <a:pPr lvl="1"/>
             <a:r>
-              <a:rPr lang="en-US" smtClean="0"/>
+              <a:rPr lang="en-US"/>
               <a:t>Second level</a:t>
             </a:r>
           </a:p>
           <a:p>
             <a:pPr lvl="2"/>
             <a:r>
-              <a:rPr lang="en-US" smtClean="0"/>
+              <a:rPr lang="en-US"/>
               <a:t>Third level</a:t>
             </a:r>
           </a:p>
           <a:p>
             <a:pPr lvl="3"/>
             <a:r>
-              <a:rPr lang="en-US" smtClean="0"/>
+              <a:rPr lang="en-US"/>
               <a:t>Fourth level</a:t>
             </a:r>
           </a:p>
           <a:p>
             <a:pPr lvl="4"/>
             <a:r>
-              <a:rPr lang="en-US" smtClean="0"/>
+              <a:rPr lang="en-US"/>
               <a:t>Fifth level</a:t>
             </a:r>
             <a:endParaRPr lang="en-CA"/>
@@ -1814,13 +1805,6 @@
   <p:clrMapOvr>
     <a:masterClrMapping/>
   </p:clrMapOvr>
-  <p:timing>
-    <p:tnLst>
-      <p:par>
-        <p:cTn id="1" dur="indefinite" restart="never" nodeType="tmRoot"/>
-      </p:par>
-    </p:tnLst>
-  </p:timing>
 </p:sldLayout>
 </file>
 
@@ -1863,35 +1847,35 @@
           <a:p>
             <a:pPr lvl="0"/>
             <a:r>
-              <a:rPr lang="en-US" smtClean="0"/>
+              <a:rPr lang="en-US"/>
               <a:t>Click to edit Master text styles</a:t>
             </a:r>
           </a:p>
           <a:p>
             <a:pPr lvl="1"/>
             <a:r>
-              <a:rPr lang="en-US" smtClean="0"/>
+              <a:rPr lang="en-US"/>
               <a:t>Second level</a:t>
             </a:r>
           </a:p>
           <a:p>
             <a:pPr lvl="2"/>
             <a:r>
-              <a:rPr lang="en-US" smtClean="0"/>
+              <a:rPr lang="en-US"/>
               <a:t>Third level</a:t>
             </a:r>
           </a:p>
           <a:p>
             <a:pPr lvl="3"/>
             <a:r>
-              <a:rPr lang="en-US" smtClean="0"/>
+              <a:rPr lang="en-US"/>
               <a:t>Fourth level</a:t>
             </a:r>
           </a:p>
           <a:p>
             <a:pPr lvl="4"/>
             <a:r>
-              <a:rPr lang="en-US" smtClean="0"/>
+              <a:rPr lang="en-US"/>
               <a:t>Fifth level</a:t>
             </a:r>
             <a:endParaRPr lang="en-CA"/>
@@ -2008,13 +1992,6 @@
   <p:clrMapOvr>
     <a:masterClrMapping/>
   </p:clrMapOvr>
-  <p:timing>
-    <p:tnLst>
-      <p:par>
-        <p:cTn id="1" dur="indefinite" restart="never" nodeType="tmRoot"/>
-      </p:par>
-    </p:tnLst>
-  </p:timing>
 </p:sldLayout>
 </file>
 
@@ -2051,7 +2028,7 @@
           <a:lstStyle/>
           <a:p>
             <a:r>
-              <a:rPr lang="en-US" smtClean="0"/>
+              <a:rPr lang="en-US"/>
               <a:t>Click to edit Master title style</a:t>
             </a:r>
             <a:endParaRPr lang="en-CA"/>
@@ -2159,13 +2136,6 @@
   <p:clrMapOvr>
     <a:masterClrMapping/>
   </p:clrMapOvr>
-  <p:timing>
-    <p:tnLst>
-      <p:par>
-        <p:cTn id="1" dur="indefinite" restart="never" nodeType="tmRoot"/>
-      </p:par>
-    </p:tnLst>
-  </p:timing>
 </p:sldLayout>
 </file>
 
@@ -2202,7 +2172,7 @@
           <a:lstStyle/>
           <a:p>
             <a:r>
-              <a:rPr lang="en-US" smtClean="0"/>
+              <a:rPr lang="en-US"/>
               <a:t>Click to edit Master title style</a:t>
             </a:r>
             <a:endParaRPr lang="en-CA"/>
@@ -2310,13 +2280,6 @@
   <p:clrMapOvr>
     <a:masterClrMapping/>
   </p:clrMapOvr>
-  <p:timing>
-    <p:tnLst>
-      <p:par>
-        <p:cTn id="1" dur="indefinite" restart="never" nodeType="tmRoot"/>
-      </p:par>
-    </p:tnLst>
-  </p:timing>
 </p:sldLayout>
 </file>
 
@@ -2358,7 +2321,7 @@
           <a:lstStyle/>
           <a:p>
             <a:r>
-              <a:rPr lang="en-US" smtClean="0"/>
+              <a:rPr lang="en-US"/>
               <a:t>Click to edit Master title style</a:t>
             </a:r>
             <a:endParaRPr lang="en-CA"/>
@@ -2387,35 +2350,35 @@
           <a:p>
             <a:pPr lvl="0"/>
             <a:r>
-              <a:rPr lang="en-US" smtClean="0"/>
+              <a:rPr lang="en-US"/>
               <a:t>Click to edit Master text styles</a:t>
             </a:r>
           </a:p>
           <a:p>
             <a:pPr lvl="1"/>
             <a:r>
-              <a:rPr lang="en-US" smtClean="0"/>
+              <a:rPr lang="en-US"/>
               <a:t>Second level</a:t>
             </a:r>
           </a:p>
           <a:p>
             <a:pPr lvl="2"/>
             <a:r>
-              <a:rPr lang="en-US" smtClean="0"/>
+              <a:rPr lang="en-US"/>
               <a:t>Third level</a:t>
             </a:r>
           </a:p>
           <a:p>
             <a:pPr lvl="3"/>
             <a:r>
-              <a:rPr lang="en-US" smtClean="0"/>
+              <a:rPr lang="en-US"/>
               <a:t>Fourth level</a:t>
             </a:r>
           </a:p>
           <a:p>
             <a:pPr lvl="4"/>
             <a:r>
-              <a:rPr lang="en-US" smtClean="0"/>
+              <a:rPr lang="en-US"/>
               <a:t>Fifth level</a:t>
             </a:r>
             <a:endParaRPr lang="en-CA"/>
@@ -2444,35 +2407,35 @@
           <a:p>
             <a:pPr lvl="0"/>
             <a:r>
-              <a:rPr lang="en-US" smtClean="0"/>
+              <a:rPr lang="en-US"/>
               <a:t>Click to edit Master text styles</a:t>
             </a:r>
           </a:p>
           <a:p>
             <a:pPr lvl="1"/>
             <a:r>
-              <a:rPr lang="en-US" smtClean="0"/>
+              <a:rPr lang="en-US"/>
               <a:t>Second level</a:t>
             </a:r>
           </a:p>
           <a:p>
             <a:pPr lvl="2"/>
             <a:r>
-              <a:rPr lang="en-US" smtClean="0"/>
+              <a:rPr lang="en-US"/>
               <a:t>Third level</a:t>
             </a:r>
           </a:p>
           <a:p>
             <a:pPr lvl="3"/>
             <a:r>
-              <a:rPr lang="en-US" smtClean="0"/>
+              <a:rPr lang="en-US"/>
               <a:t>Fourth level</a:t>
             </a:r>
           </a:p>
           <a:p>
             <a:pPr lvl="4"/>
             <a:r>
-              <a:rPr lang="en-US" smtClean="0"/>
+              <a:rPr lang="en-US"/>
               <a:t>Fifth level</a:t>
             </a:r>
             <a:endParaRPr lang="en-CA"/>
@@ -2501,35 +2464,35 @@
           <a:p>
             <a:pPr lvl="0"/>
             <a:r>
-              <a:rPr lang="en-US" smtClean="0"/>
+              <a:rPr lang="en-US"/>
               <a:t>Click to edit Master text styles</a:t>
             </a:r>
           </a:p>
           <a:p>
             <a:pPr lvl="1"/>
             <a:r>
-              <a:rPr lang="en-US" smtClean="0"/>
+              <a:rPr lang="en-US"/>
               <a:t>Second level</a:t>
             </a:r>
           </a:p>
           <a:p>
             <a:pPr lvl="2"/>
             <a:r>
-              <a:rPr lang="en-US" smtClean="0"/>
+              <a:rPr lang="en-US"/>
               <a:t>Third level</a:t>
             </a:r>
           </a:p>
           <a:p>
             <a:pPr lvl="3"/>
             <a:r>
-              <a:rPr lang="en-US" smtClean="0"/>
+              <a:rPr lang="en-US"/>
               <a:t>Fourth level</a:t>
             </a:r>
           </a:p>
           <a:p>
             <a:pPr lvl="4"/>
             <a:r>
-              <a:rPr lang="en-US" smtClean="0"/>
+              <a:rPr lang="en-US"/>
               <a:t>Fifth level</a:t>
             </a:r>
             <a:endParaRPr lang="en-CA"/>
@@ -2646,13 +2609,6 @@
   <p:clrMapOvr>
     <a:masterClrMapping/>
   </p:clrMapOvr>
-  <p:timing>
-    <p:tnLst>
-      <p:par>
-        <p:cTn id="1" dur="indefinite" restart="never" nodeType="tmRoot"/>
-      </p:par>
-    </p:tnLst>
-  </p:timing>
 </p:sldLayout>
 </file>
 
@@ -2694,7 +2650,7 @@
           <a:lstStyle/>
           <a:p>
             <a:r>
-              <a:rPr lang="en-US" smtClean="0"/>
+              <a:rPr lang="en-US"/>
               <a:t>Click to edit Master title style</a:t>
             </a:r>
             <a:endParaRPr lang="en-CA"/>
@@ -2723,35 +2679,35 @@
           <a:p>
             <a:pPr lvl="0"/>
             <a:r>
-              <a:rPr lang="en-US" smtClean="0"/>
+              <a:rPr lang="en-US"/>
               <a:t>Click to edit Master text styles</a:t>
             </a:r>
           </a:p>
           <a:p>
             <a:pPr lvl="1"/>
             <a:r>
-              <a:rPr lang="en-US" smtClean="0"/>
+              <a:rPr lang="en-US"/>
               <a:t>Second level</a:t>
             </a:r>
           </a:p>
           <a:p>
             <a:pPr lvl="2"/>
             <a:r>
-              <a:rPr lang="en-US" smtClean="0"/>
+              <a:rPr lang="en-US"/>
               <a:t>Third level</a:t>
             </a:r>
           </a:p>
           <a:p>
             <a:pPr lvl="3"/>
             <a:r>
-              <a:rPr lang="en-US" smtClean="0"/>
+              <a:rPr lang="en-US"/>
               <a:t>Fourth level</a:t>
             </a:r>
           </a:p>
           <a:p>
             <a:pPr lvl="4"/>
             <a:r>
-              <a:rPr lang="en-US" smtClean="0"/>
+              <a:rPr lang="en-US"/>
               <a:t>Fifth level</a:t>
             </a:r>
             <a:endParaRPr lang="en-CA"/>
@@ -2779,7 +2735,7 @@
           <a:lstStyle/>
           <a:p>
             <a:r>
-              <a:rPr lang="en-US" smtClean="0"/>
+              <a:rPr lang="en-US"/>
               <a:t>Click icon to add media</a:t>
             </a:r>
             <a:endParaRPr lang="en-CA"/>
@@ -2896,13 +2852,6 @@
   <p:clrMapOvr>
     <a:masterClrMapping/>
   </p:clrMapOvr>
-  <p:timing>
-    <p:tnLst>
-      <p:par>
-        <p:cTn id="1" dur="indefinite" restart="never" nodeType="tmRoot"/>
-      </p:par>
-    </p:tnLst>
-  </p:timing>
 </p:sldLayout>
 </file>
 
@@ -2944,7 +2893,7 @@
           <a:lstStyle/>
           <a:p>
             <a:r>
-              <a:rPr lang="en-US" smtClean="0"/>
+              <a:rPr lang="en-US"/>
               <a:t>Click to edit Master title style</a:t>
             </a:r>
             <a:endParaRPr lang="en-CA"/>
@@ -2973,35 +2922,35 @@
           <a:p>
             <a:pPr lvl="0"/>
             <a:r>
-              <a:rPr lang="en-US" smtClean="0"/>
+              <a:rPr lang="en-US"/>
               <a:t>Click to edit Master text styles</a:t>
             </a:r>
           </a:p>
           <a:p>
             <a:pPr lvl="1"/>
             <a:r>
-              <a:rPr lang="en-US" smtClean="0"/>
+              <a:rPr lang="en-US"/>
               <a:t>Second level</a:t>
             </a:r>
           </a:p>
           <a:p>
             <a:pPr lvl="2"/>
             <a:r>
-              <a:rPr lang="en-US" smtClean="0"/>
+              <a:rPr lang="en-US"/>
               <a:t>Third level</a:t>
             </a:r>
           </a:p>
           <a:p>
             <a:pPr lvl="3"/>
             <a:r>
-              <a:rPr lang="en-US" smtClean="0"/>
+              <a:rPr lang="en-US"/>
               <a:t>Fourth level</a:t>
             </a:r>
           </a:p>
           <a:p>
             <a:pPr lvl="4"/>
             <a:r>
-              <a:rPr lang="en-US" smtClean="0"/>
+              <a:rPr lang="en-US"/>
               <a:t>Fifth level</a:t>
             </a:r>
             <a:endParaRPr lang="en-CA"/>
@@ -3030,35 +2979,35 @@
           <a:p>
             <a:pPr lvl="0"/>
             <a:r>
-              <a:rPr lang="en-US" smtClean="0"/>
+              <a:rPr lang="en-US"/>
               <a:t>Click to edit Master text styles</a:t>
             </a:r>
           </a:p>
           <a:p>
             <a:pPr lvl="1"/>
             <a:r>
-              <a:rPr lang="en-US" smtClean="0"/>
+              <a:rPr lang="en-US"/>
               <a:t>Second level</a:t>
             </a:r>
           </a:p>
           <a:p>
             <a:pPr lvl="2"/>
             <a:r>
-              <a:rPr lang="en-US" smtClean="0"/>
+              <a:rPr lang="en-US"/>
               <a:t>Third level</a:t>
             </a:r>
           </a:p>
           <a:p>
             <a:pPr lvl="3"/>
             <a:r>
-              <a:rPr lang="en-US" smtClean="0"/>
+              <a:rPr lang="en-US"/>
               <a:t>Fourth level</a:t>
             </a:r>
           </a:p>
           <a:p>
             <a:pPr lvl="4"/>
             <a:r>
-              <a:rPr lang="en-US" smtClean="0"/>
+              <a:rPr lang="en-US"/>
               <a:t>Fifth level</a:t>
             </a:r>
             <a:endParaRPr lang="en-CA"/>
@@ -3087,35 +3036,35 @@
           <a:p>
             <a:pPr lvl="0"/>
             <a:r>
-              <a:rPr lang="en-US" smtClean="0"/>
+              <a:rPr lang="en-US"/>
               <a:t>Click to edit Master text styles</a:t>
             </a:r>
           </a:p>
           <a:p>
             <a:pPr lvl="1"/>
             <a:r>
-              <a:rPr lang="en-US" smtClean="0"/>
+              <a:rPr lang="en-US"/>
               <a:t>Second level</a:t>
             </a:r>
           </a:p>
           <a:p>
             <a:pPr lvl="2"/>
             <a:r>
-              <a:rPr lang="en-US" smtClean="0"/>
+              <a:rPr lang="en-US"/>
               <a:t>Third level</a:t>
             </a:r>
           </a:p>
           <a:p>
             <a:pPr lvl="3"/>
             <a:r>
-              <a:rPr lang="en-US" smtClean="0"/>
+              <a:rPr lang="en-US"/>
               <a:t>Fourth level</a:t>
             </a:r>
           </a:p>
           <a:p>
             <a:pPr lvl="4"/>
             <a:r>
-              <a:rPr lang="en-US" smtClean="0"/>
+              <a:rPr lang="en-US"/>
               <a:t>Fifth level</a:t>
             </a:r>
             <a:endParaRPr lang="en-CA"/>
@@ -3144,35 +3093,35 @@
           <a:p>
             <a:pPr lvl="0"/>
             <a:r>
-              <a:rPr lang="en-US" smtClean="0"/>
+              <a:rPr lang="en-US"/>
               <a:t>Click to edit Master text styles</a:t>
             </a:r>
           </a:p>
           <a:p>
             <a:pPr lvl="1"/>
             <a:r>
-              <a:rPr lang="en-US" smtClean="0"/>
+              <a:rPr lang="en-US"/>
               <a:t>Second level</a:t>
             </a:r>
           </a:p>
           <a:p>
             <a:pPr lvl="2"/>
             <a:r>
-              <a:rPr lang="en-US" smtClean="0"/>
+              <a:rPr lang="en-US"/>
               <a:t>Third level</a:t>
             </a:r>
           </a:p>
           <a:p>
             <a:pPr lvl="3"/>
             <a:r>
-              <a:rPr lang="en-US" smtClean="0"/>
+              <a:rPr lang="en-US"/>
               <a:t>Fourth level</a:t>
             </a:r>
           </a:p>
           <a:p>
             <a:pPr lvl="4"/>
             <a:r>
-              <a:rPr lang="en-US" smtClean="0"/>
+              <a:rPr lang="en-US"/>
               <a:t>Fifth level</a:t>
             </a:r>
             <a:endParaRPr lang="en-CA"/>
@@ -3289,13 +3238,6 @@
   <p:clrMapOvr>
     <a:masterClrMapping/>
   </p:clrMapOvr>
-  <p:timing>
-    <p:tnLst>
-      <p:par>
-        <p:cTn id="1" dur="indefinite" restart="never" nodeType="tmRoot"/>
-      </p:par>
-    </p:tnLst>
-  </p:timing>
 </p:sldLayout>
 </file>
 
@@ -3337,7 +3279,7 @@
           <a:lstStyle/>
           <a:p>
             <a:r>
-              <a:rPr lang="en-US" smtClean="0"/>
+              <a:rPr lang="en-US"/>
               <a:t>Click to edit Master title style</a:t>
             </a:r>
             <a:endParaRPr lang="en-CA"/>
@@ -3366,35 +3308,35 @@
           <a:p>
             <a:pPr lvl="0"/>
             <a:r>
-              <a:rPr lang="en-US" smtClean="0"/>
+              <a:rPr lang="en-US"/>
               <a:t>Click to edit Master text styles</a:t>
             </a:r>
           </a:p>
           <a:p>
             <a:pPr lvl="1"/>
             <a:r>
-              <a:rPr lang="en-US" smtClean="0"/>
+              <a:rPr lang="en-US"/>
               <a:t>Second level</a:t>
             </a:r>
           </a:p>
           <a:p>
             <a:pPr lvl="2"/>
             <a:r>
-              <a:rPr lang="en-US" smtClean="0"/>
+              <a:rPr lang="en-US"/>
               <a:t>Third level</a:t>
             </a:r>
           </a:p>
           <a:p>
             <a:pPr lvl="3"/>
             <a:r>
-              <a:rPr lang="en-US" smtClean="0"/>
+              <a:rPr lang="en-US"/>
               <a:t>Fourth level</a:t>
             </a:r>
           </a:p>
           <a:p>
             <a:pPr lvl="4"/>
             <a:r>
-              <a:rPr lang="en-US" smtClean="0"/>
+              <a:rPr lang="en-US"/>
               <a:t>Fifth level</a:t>
             </a:r>
             <a:endParaRPr lang="en-CA"/>
@@ -3423,35 +3365,35 @@
           <a:p>
             <a:pPr lvl="0"/>
             <a:r>
-              <a:rPr lang="en-US" smtClean="0"/>
+              <a:rPr lang="en-US"/>
               <a:t>Click to edit Master text styles</a:t>
             </a:r>
           </a:p>
           <a:p>
             <a:pPr lvl="1"/>
             <a:r>
-              <a:rPr lang="en-US" smtClean="0"/>
+              <a:rPr lang="en-US"/>
               <a:t>Second level</a:t>
             </a:r>
           </a:p>
           <a:p>
             <a:pPr lvl="2"/>
             <a:r>
-              <a:rPr lang="en-US" smtClean="0"/>
+              <a:rPr lang="en-US"/>
               <a:t>Third level</a:t>
             </a:r>
           </a:p>
           <a:p>
             <a:pPr lvl="3"/>
             <a:r>
-              <a:rPr lang="en-US" smtClean="0"/>
+              <a:rPr lang="en-US"/>
               <a:t>Fourth level</a:t>
             </a:r>
           </a:p>
           <a:p>
             <a:pPr lvl="4"/>
             <a:r>
-              <a:rPr lang="en-US" smtClean="0"/>
+              <a:rPr lang="en-US"/>
               <a:t>Fifth level</a:t>
             </a:r>
             <a:endParaRPr lang="en-CA"/>
@@ -3480,35 +3422,35 @@
           <a:p>
             <a:pPr lvl="0"/>
             <a:r>
-              <a:rPr lang="en-US" smtClean="0"/>
+              <a:rPr lang="en-US"/>
               <a:t>Click to edit Master text styles</a:t>
             </a:r>
           </a:p>
           <a:p>
             <a:pPr lvl="1"/>
             <a:r>
-              <a:rPr lang="en-US" smtClean="0"/>
+              <a:rPr lang="en-US"/>
               <a:t>Second level</a:t>
             </a:r>
           </a:p>
           <a:p>
             <a:pPr lvl="2"/>
             <a:r>
-              <a:rPr lang="en-US" smtClean="0"/>
+              <a:rPr lang="en-US"/>
               <a:t>Third level</a:t>
             </a:r>
           </a:p>
           <a:p>
             <a:pPr lvl="3"/>
             <a:r>
-              <a:rPr lang="en-US" smtClean="0"/>
+              <a:rPr lang="en-US"/>
               <a:t>Fourth level</a:t>
             </a:r>
           </a:p>
           <a:p>
             <a:pPr lvl="4"/>
             <a:r>
-              <a:rPr lang="en-US" smtClean="0"/>
+              <a:rPr lang="en-US"/>
               <a:t>Fifth level</a:t>
             </a:r>
             <a:endParaRPr lang="en-CA"/>
@@ -3625,13 +3567,6 @@
   <p:clrMapOvr>
     <a:masterClrMapping/>
   </p:clrMapOvr>
-  <p:timing>
-    <p:tnLst>
-      <p:par>
-        <p:cTn id="1" dur="indefinite" restart="never" nodeType="tmRoot"/>
-      </p:par>
-    </p:tnLst>
-  </p:timing>
 </p:sldLayout>
 </file>
 
@@ -3668,7 +3603,7 @@
           <a:lstStyle/>
           <a:p>
             <a:r>
-              <a:rPr lang="en-US" smtClean="0"/>
+              <a:rPr lang="en-US"/>
               <a:t>Click to edit Master title style</a:t>
             </a:r>
             <a:endParaRPr lang="en-CA" dirty="0"/>
@@ -3692,35 +3627,35 @@
           <a:p>
             <a:pPr lvl="0"/>
             <a:r>
-              <a:rPr lang="en-US" smtClean="0"/>
+              <a:rPr lang="en-US"/>
               <a:t>Click to edit Master text styles</a:t>
             </a:r>
           </a:p>
           <a:p>
             <a:pPr lvl="1"/>
             <a:r>
-              <a:rPr lang="en-US" smtClean="0"/>
+              <a:rPr lang="en-US"/>
               <a:t>Second level</a:t>
             </a:r>
           </a:p>
           <a:p>
             <a:pPr lvl="2"/>
             <a:r>
-              <a:rPr lang="en-US" smtClean="0"/>
+              <a:rPr lang="en-US"/>
               <a:t>Third level</a:t>
             </a:r>
           </a:p>
           <a:p>
             <a:pPr lvl="3"/>
             <a:r>
-              <a:rPr lang="en-US" smtClean="0"/>
+              <a:rPr lang="en-US"/>
               <a:t>Fourth level</a:t>
             </a:r>
           </a:p>
           <a:p>
             <a:pPr lvl="4"/>
             <a:r>
-              <a:rPr lang="en-US" smtClean="0"/>
+              <a:rPr lang="en-US"/>
               <a:t>Fifth level</a:t>
             </a:r>
             <a:endParaRPr lang="en-CA" dirty="0"/>
@@ -3811,13 +3746,6 @@
   <p:clrMapOvr>
     <a:masterClrMapping/>
   </p:clrMapOvr>
-  <p:timing>
-    <p:tnLst>
-      <p:par>
-        <p:cTn id="1" dur="indefinite" restart="never" nodeType="tmRoot"/>
-      </p:par>
-    </p:tnLst>
-  </p:timing>
 </p:sldLayout>
 </file>
 
@@ -4348,10 +4276,9 @@
           </a:lstStyle>
           <a:p>
             <a:r>
-              <a:rPr lang="en-US" smtClean="0"/>
+              <a:rPr lang="en-US"/>
               <a:t>Click to edit Master title style</a:t>
             </a:r>
-            <a:endParaRPr lang="en-US"/>
           </a:p>
         </p:txBody>
       </p:sp>
@@ -4413,10 +4340,9 @@
           </a:lstStyle>
           <a:p>
             <a:r>
-              <a:rPr lang="en-US" smtClean="0"/>
+              <a:rPr lang="en-US"/>
               <a:t>Click to edit Master subtitle style</a:t>
             </a:r>
-            <a:endParaRPr lang="en-US"/>
           </a:p>
         </p:txBody>
       </p:sp>
@@ -4552,10 +4478,9 @@
           <a:lstStyle/>
           <a:p>
             <a:r>
-              <a:rPr lang="en-US" smtClean="0"/>
+              <a:rPr lang="en-US"/>
               <a:t>Click to edit Master title style</a:t>
             </a:r>
-            <a:endParaRPr lang="en-US"/>
           </a:p>
         </p:txBody>
       </p:sp>
@@ -4576,38 +4501,37 @@
           <a:p>
             <a:pPr lvl="0"/>
             <a:r>
-              <a:rPr lang="en-US" smtClean="0"/>
+              <a:rPr lang="en-US"/>
               <a:t>Click to edit Master text styles</a:t>
             </a:r>
           </a:p>
           <a:p>
             <a:pPr lvl="1"/>
             <a:r>
-              <a:rPr lang="en-US" smtClean="0"/>
+              <a:rPr lang="en-US"/>
               <a:t>Second level</a:t>
             </a:r>
           </a:p>
           <a:p>
             <a:pPr lvl="2"/>
             <a:r>
-              <a:rPr lang="en-US" smtClean="0"/>
+              <a:rPr lang="en-US"/>
               <a:t>Third level</a:t>
             </a:r>
           </a:p>
           <a:p>
             <a:pPr lvl="3"/>
             <a:r>
-              <a:rPr lang="en-US" smtClean="0"/>
+              <a:rPr lang="en-US"/>
               <a:t>Fourth level</a:t>
             </a:r>
           </a:p>
           <a:p>
             <a:pPr lvl="4"/>
             <a:r>
-              <a:rPr lang="en-US" smtClean="0"/>
+              <a:rPr lang="en-US"/>
               <a:t>Fifth level</a:t>
             </a:r>
-            <a:endParaRPr lang="en-US"/>
           </a:p>
         </p:txBody>
       </p:sp>
@@ -4752,10 +4676,9 @@
           </a:lstStyle>
           <a:p>
             <a:r>
-              <a:rPr lang="en-US" smtClean="0"/>
+              <a:rPr lang="en-US"/>
               <a:t>Click to edit Master title style</a:t>
             </a:r>
-            <a:endParaRPr lang="en-US"/>
           </a:p>
         </p:txBody>
       </p:sp>
@@ -4872,7 +4795,7 @@
           <a:p>
             <a:pPr lvl="0"/>
             <a:r>
-              <a:rPr lang="en-US" smtClean="0"/>
+              <a:rPr lang="en-US"/>
               <a:t>Click to edit Master text styles</a:t>
             </a:r>
           </a:p>
@@ -5010,10 +4933,9 @@
           <a:lstStyle/>
           <a:p>
             <a:r>
-              <a:rPr lang="en-US" smtClean="0"/>
+              <a:rPr lang="en-US"/>
               <a:t>Click to edit Master title style</a:t>
             </a:r>
-            <a:endParaRPr lang="en-US"/>
           </a:p>
         </p:txBody>
       </p:sp>
@@ -5039,38 +4961,37 @@
           <a:p>
             <a:pPr lvl="0"/>
             <a:r>
-              <a:rPr lang="en-US" smtClean="0"/>
+              <a:rPr lang="en-US"/>
               <a:t>Click to edit Master text styles</a:t>
             </a:r>
           </a:p>
           <a:p>
             <a:pPr lvl="1"/>
             <a:r>
-              <a:rPr lang="en-US" smtClean="0"/>
+              <a:rPr lang="en-US"/>
               <a:t>Second level</a:t>
             </a:r>
           </a:p>
           <a:p>
             <a:pPr lvl="2"/>
             <a:r>
-              <a:rPr lang="en-US" smtClean="0"/>
+              <a:rPr lang="en-US"/>
               <a:t>Third level</a:t>
             </a:r>
           </a:p>
           <a:p>
             <a:pPr lvl="3"/>
             <a:r>
-              <a:rPr lang="en-US" smtClean="0"/>
+              <a:rPr lang="en-US"/>
               <a:t>Fourth level</a:t>
             </a:r>
           </a:p>
           <a:p>
             <a:pPr lvl="4"/>
             <a:r>
-              <a:rPr lang="en-US" smtClean="0"/>
+              <a:rPr lang="en-US"/>
               <a:t>Fifth level</a:t>
             </a:r>
-            <a:endParaRPr lang="en-US"/>
           </a:p>
         </p:txBody>
       </p:sp>
@@ -5096,38 +5017,37 @@
           <a:p>
             <a:pPr lvl="0"/>
             <a:r>
-              <a:rPr lang="en-US" smtClean="0"/>
+              <a:rPr lang="en-US"/>
               <a:t>Click to edit Master text styles</a:t>
             </a:r>
           </a:p>
           <a:p>
             <a:pPr lvl="1"/>
             <a:r>
-              <a:rPr lang="en-US" smtClean="0"/>
+              <a:rPr lang="en-US"/>
               <a:t>Second level</a:t>
             </a:r>
           </a:p>
           <a:p>
             <a:pPr lvl="2"/>
             <a:r>
-              <a:rPr lang="en-US" smtClean="0"/>
+              <a:rPr lang="en-US"/>
               <a:t>Third level</a:t>
             </a:r>
           </a:p>
           <a:p>
             <a:pPr lvl="3"/>
             <a:r>
-              <a:rPr lang="en-US" smtClean="0"/>
+              <a:rPr lang="en-US"/>
               <a:t>Fourth level</a:t>
             </a:r>
           </a:p>
           <a:p>
             <a:pPr lvl="4"/>
             <a:r>
-              <a:rPr lang="en-US" smtClean="0"/>
+              <a:rPr lang="en-US"/>
               <a:t>Fifth level</a:t>
             </a:r>
-            <a:endParaRPr lang="en-US"/>
           </a:p>
         </p:txBody>
       </p:sp>
@@ -5268,10 +5188,9 @@
           <a:lstStyle/>
           <a:p>
             <a:r>
-              <a:rPr lang="en-US" smtClean="0"/>
+              <a:rPr lang="en-US"/>
               <a:t>Click to edit Master title style</a:t>
             </a:r>
-            <a:endParaRPr lang="en-US"/>
           </a:p>
         </p:txBody>
       </p:sp>
@@ -5334,7 +5253,7 @@
           <a:p>
             <a:pPr lvl="0"/>
             <a:r>
-              <a:rPr lang="en-US" smtClean="0"/>
+              <a:rPr lang="en-US"/>
               <a:t>Click to edit Master text styles</a:t>
             </a:r>
           </a:p>
@@ -5362,38 +5281,37 @@
           <a:p>
             <a:pPr lvl="0"/>
             <a:r>
-              <a:rPr lang="en-US" smtClean="0"/>
+              <a:rPr lang="en-US"/>
               <a:t>Click to edit Master text styles</a:t>
             </a:r>
           </a:p>
           <a:p>
             <a:pPr lvl="1"/>
             <a:r>
-              <a:rPr lang="en-US" smtClean="0"/>
+              <a:rPr lang="en-US"/>
               <a:t>Second level</a:t>
             </a:r>
           </a:p>
           <a:p>
             <a:pPr lvl="2"/>
             <a:r>
-              <a:rPr lang="en-US" smtClean="0"/>
+              <a:rPr lang="en-US"/>
               <a:t>Third level</a:t>
             </a:r>
           </a:p>
           <a:p>
             <a:pPr lvl="3"/>
             <a:r>
-              <a:rPr lang="en-US" smtClean="0"/>
+              <a:rPr lang="en-US"/>
               <a:t>Fourth level</a:t>
             </a:r>
           </a:p>
           <a:p>
             <a:pPr lvl="4"/>
             <a:r>
-              <a:rPr lang="en-US" smtClean="0"/>
+              <a:rPr lang="en-US"/>
               <a:t>Fifth level</a:t>
             </a:r>
-            <a:endParaRPr lang="en-US"/>
           </a:p>
         </p:txBody>
       </p:sp>
@@ -5456,7 +5374,7 @@
           <a:p>
             <a:pPr lvl="0"/>
             <a:r>
-              <a:rPr lang="en-US" smtClean="0"/>
+              <a:rPr lang="en-US"/>
               <a:t>Click to edit Master text styles</a:t>
             </a:r>
           </a:p>
@@ -5484,38 +5402,37 @@
           <a:p>
             <a:pPr lvl="0"/>
             <a:r>
-              <a:rPr lang="en-US" smtClean="0"/>
+              <a:rPr lang="en-US"/>
               <a:t>Click to edit Master text styles</a:t>
             </a:r>
           </a:p>
           <a:p>
             <a:pPr lvl="1"/>
             <a:r>
-              <a:rPr lang="en-US" smtClean="0"/>
+              <a:rPr lang="en-US"/>
               <a:t>Second level</a:t>
             </a:r>
           </a:p>
           <a:p>
             <a:pPr lvl="2"/>
             <a:r>
-              <a:rPr lang="en-US" smtClean="0"/>
+              <a:rPr lang="en-US"/>
               <a:t>Third level</a:t>
             </a:r>
           </a:p>
           <a:p>
             <a:pPr lvl="3"/>
             <a:r>
-              <a:rPr lang="en-US" smtClean="0"/>
+              <a:rPr lang="en-US"/>
               <a:t>Fourth level</a:t>
             </a:r>
           </a:p>
           <a:p>
             <a:pPr lvl="4"/>
             <a:r>
-              <a:rPr lang="en-US" smtClean="0"/>
+              <a:rPr lang="en-US"/>
               <a:t>Fifth level</a:t>
             </a:r>
-            <a:endParaRPr lang="en-US"/>
           </a:p>
         </p:txBody>
       </p:sp>
@@ -5651,10 +5568,9 @@
           <a:lstStyle/>
           <a:p>
             <a:r>
-              <a:rPr lang="en-US" smtClean="0"/>
+              <a:rPr lang="en-US"/>
               <a:t>Click to edit Master title style</a:t>
             </a:r>
-            <a:endParaRPr lang="en-US"/>
           </a:p>
         </p:txBody>
       </p:sp>
@@ -5915,10 +5831,9 @@
           </a:lstStyle>
           <a:p>
             <a:r>
-              <a:rPr lang="en-US" smtClean="0"/>
+              <a:rPr lang="en-US"/>
               <a:t>Click to edit Master title style</a:t>
             </a:r>
-            <a:endParaRPr lang="en-US"/>
           </a:p>
         </p:txBody>
       </p:sp>
@@ -5972,38 +5887,37 @@
           <a:p>
             <a:pPr lvl="0"/>
             <a:r>
-              <a:rPr lang="en-US" smtClean="0"/>
+              <a:rPr lang="en-US"/>
               <a:t>Click to edit Master text styles</a:t>
             </a:r>
           </a:p>
           <a:p>
             <a:pPr lvl="1"/>
             <a:r>
-              <a:rPr lang="en-US" smtClean="0"/>
+              <a:rPr lang="en-US"/>
               <a:t>Second level</a:t>
             </a:r>
           </a:p>
           <a:p>
             <a:pPr lvl="2"/>
             <a:r>
-              <a:rPr lang="en-US" smtClean="0"/>
+              <a:rPr lang="en-US"/>
               <a:t>Third level</a:t>
             </a:r>
           </a:p>
           <a:p>
             <a:pPr lvl="3"/>
             <a:r>
-              <a:rPr lang="en-US" smtClean="0"/>
+              <a:rPr lang="en-US"/>
               <a:t>Fourth level</a:t>
             </a:r>
           </a:p>
           <a:p>
             <a:pPr lvl="4"/>
             <a:r>
-              <a:rPr lang="en-US" smtClean="0"/>
+              <a:rPr lang="en-US"/>
               <a:t>Fifth level</a:t>
             </a:r>
-            <a:endParaRPr lang="en-US"/>
           </a:p>
         </p:txBody>
       </p:sp>
@@ -6066,7 +5980,7 @@
           <a:p>
             <a:pPr lvl="0"/>
             <a:r>
-              <a:rPr lang="en-US" smtClean="0"/>
+              <a:rPr lang="en-US"/>
               <a:t>Click to edit Master text styles</a:t>
             </a:r>
           </a:p>
@@ -6213,10 +6127,9 @@
           </a:lstStyle>
           <a:p>
             <a:r>
-              <a:rPr lang="en-US" smtClean="0"/>
+              <a:rPr lang="en-US"/>
               <a:t>Click to edit Master title style</a:t>
             </a:r>
-            <a:endParaRPr lang="en-US"/>
           </a:p>
         </p:txBody>
       </p:sp>
@@ -6278,10 +6191,9 @@
           </a:lstStyle>
           <a:p>
             <a:r>
-              <a:rPr lang="en-US" smtClean="0"/>
+              <a:rPr lang="en-US"/>
               <a:t>Click icon to add picture</a:t>
             </a:r>
-            <a:endParaRPr lang="en-US"/>
           </a:p>
         </p:txBody>
       </p:sp>
@@ -6344,7 +6256,7 @@
           <a:p>
             <a:pPr lvl="0"/>
             <a:r>
-              <a:rPr lang="en-US" smtClean="0"/>
+              <a:rPr lang="en-US"/>
               <a:t>Click to edit Master text styles</a:t>
             </a:r>
           </a:p>
@@ -6491,7 +6403,7 @@
           </a:lstStyle>
           <a:p>
             <a:r>
-              <a:rPr lang="en-US" smtClean="0"/>
+              <a:rPr lang="en-US"/>
               <a:t>Click to edit Master title style</a:t>
             </a:r>
             <a:endParaRPr lang="en-CA"/>
@@ -6557,7 +6469,7 @@
           <a:p>
             <a:pPr lvl="0"/>
             <a:r>
-              <a:rPr lang="en-US" smtClean="0"/>
+              <a:rPr lang="en-US"/>
               <a:t>Click to edit Master text styles</a:t>
             </a:r>
           </a:p>
@@ -6668,13 +6580,6 @@
   <p:clrMapOvr>
     <a:masterClrMapping/>
   </p:clrMapOvr>
-  <p:timing>
-    <p:tnLst>
-      <p:par>
-        <p:cTn id="1" dur="indefinite" restart="never" nodeType="tmRoot"/>
-      </p:par>
-    </p:tnLst>
-  </p:timing>
 </p:sldLayout>
 </file>
 
@@ -6711,10 +6616,9 @@
           <a:lstStyle/>
           <a:p>
             <a:r>
-              <a:rPr lang="en-US" smtClean="0"/>
+              <a:rPr lang="en-US"/>
               <a:t>Click to edit Master title style</a:t>
             </a:r>
-            <a:endParaRPr lang="en-US"/>
           </a:p>
         </p:txBody>
       </p:sp>
@@ -6735,38 +6639,37 @@
           <a:p>
             <a:pPr lvl="0"/>
             <a:r>
-              <a:rPr lang="en-US" smtClean="0"/>
+              <a:rPr lang="en-US"/>
               <a:t>Click to edit Master text styles</a:t>
             </a:r>
           </a:p>
           <a:p>
             <a:pPr lvl="1"/>
             <a:r>
-              <a:rPr lang="en-US" smtClean="0"/>
+              <a:rPr lang="en-US"/>
               <a:t>Second level</a:t>
             </a:r>
           </a:p>
           <a:p>
             <a:pPr lvl="2"/>
             <a:r>
-              <a:rPr lang="en-US" smtClean="0"/>
+              <a:rPr lang="en-US"/>
               <a:t>Third level</a:t>
             </a:r>
           </a:p>
           <a:p>
             <a:pPr lvl="3"/>
             <a:r>
-              <a:rPr lang="en-US" smtClean="0"/>
+              <a:rPr lang="en-US"/>
               <a:t>Fourth level</a:t>
             </a:r>
           </a:p>
           <a:p>
             <a:pPr lvl="4"/>
             <a:r>
-              <a:rPr lang="en-US" smtClean="0"/>
+              <a:rPr lang="en-US"/>
               <a:t>Fifth level</a:t>
             </a:r>
-            <a:endParaRPr lang="en-US"/>
           </a:p>
         </p:txBody>
       </p:sp>
@@ -6907,10 +6810,9 @@
           <a:lstStyle/>
           <a:p>
             <a:r>
-              <a:rPr lang="en-US" smtClean="0"/>
+              <a:rPr lang="en-US"/>
               <a:t>Click to edit Master title style</a:t>
             </a:r>
-            <a:endParaRPr lang="en-US"/>
           </a:p>
         </p:txBody>
       </p:sp>
@@ -6936,38 +6838,37 @@
           <a:p>
             <a:pPr lvl="0"/>
             <a:r>
-              <a:rPr lang="en-US" smtClean="0"/>
+              <a:rPr lang="en-US"/>
               <a:t>Click to edit Master text styles</a:t>
             </a:r>
           </a:p>
           <a:p>
             <a:pPr lvl="1"/>
             <a:r>
-              <a:rPr lang="en-US" smtClean="0"/>
+              <a:rPr lang="en-US"/>
               <a:t>Second level</a:t>
             </a:r>
           </a:p>
           <a:p>
             <a:pPr lvl="2"/>
             <a:r>
-              <a:rPr lang="en-US" smtClean="0"/>
+              <a:rPr lang="en-US"/>
               <a:t>Third level</a:t>
             </a:r>
           </a:p>
           <a:p>
             <a:pPr lvl="3"/>
             <a:r>
-              <a:rPr lang="en-US" smtClean="0"/>
+              <a:rPr lang="en-US"/>
               <a:t>Fourth level</a:t>
             </a:r>
           </a:p>
           <a:p>
             <a:pPr lvl="4"/>
             <a:r>
-              <a:rPr lang="en-US" smtClean="0"/>
+              <a:rPr lang="en-US"/>
               <a:t>Fifth level</a:t>
             </a:r>
-            <a:endParaRPr lang="en-US"/>
           </a:p>
         </p:txBody>
       </p:sp>
@@ -7103,7 +7004,7 @@
           <a:lstStyle/>
           <a:p>
             <a:r>
-              <a:rPr lang="en-US" smtClean="0"/>
+              <a:rPr lang="en-US"/>
               <a:t>Click to edit Master title style</a:t>
             </a:r>
             <a:endParaRPr lang="en-CA"/>
@@ -7160,35 +7061,35 @@
           <a:p>
             <a:pPr lvl="0"/>
             <a:r>
-              <a:rPr lang="en-US" smtClean="0"/>
+              <a:rPr lang="en-US"/>
               <a:t>Click to edit Master text styles</a:t>
             </a:r>
           </a:p>
           <a:p>
             <a:pPr lvl="1"/>
             <a:r>
-              <a:rPr lang="en-US" smtClean="0"/>
+              <a:rPr lang="en-US"/>
               <a:t>Second level</a:t>
             </a:r>
           </a:p>
           <a:p>
             <a:pPr lvl="2"/>
             <a:r>
-              <a:rPr lang="en-US" smtClean="0"/>
+              <a:rPr lang="en-US"/>
               <a:t>Third level</a:t>
             </a:r>
           </a:p>
           <a:p>
             <a:pPr lvl="3"/>
             <a:r>
-              <a:rPr lang="en-US" smtClean="0"/>
+              <a:rPr lang="en-US"/>
               <a:t>Fourth level</a:t>
             </a:r>
           </a:p>
           <a:p>
             <a:pPr lvl="4"/>
             <a:r>
-              <a:rPr lang="en-US" smtClean="0"/>
+              <a:rPr lang="en-US"/>
               <a:t>Fifth level</a:t>
             </a:r>
             <a:endParaRPr lang="en-CA"/>
@@ -7245,35 +7146,35 @@
           <a:p>
             <a:pPr lvl="0"/>
             <a:r>
-              <a:rPr lang="en-US" smtClean="0"/>
+              <a:rPr lang="en-US"/>
               <a:t>Click to edit Master text styles</a:t>
             </a:r>
           </a:p>
           <a:p>
             <a:pPr lvl="1"/>
             <a:r>
-              <a:rPr lang="en-US" smtClean="0"/>
+              <a:rPr lang="en-US"/>
               <a:t>Second level</a:t>
             </a:r>
           </a:p>
           <a:p>
             <a:pPr lvl="2"/>
             <a:r>
-              <a:rPr lang="en-US" smtClean="0"/>
+              <a:rPr lang="en-US"/>
               <a:t>Third level</a:t>
             </a:r>
           </a:p>
           <a:p>
             <a:pPr lvl="3"/>
             <a:r>
-              <a:rPr lang="en-US" smtClean="0"/>
+              <a:rPr lang="en-US"/>
               <a:t>Fourth level</a:t>
             </a:r>
           </a:p>
           <a:p>
             <a:pPr lvl="4"/>
             <a:r>
-              <a:rPr lang="en-US" smtClean="0"/>
+              <a:rPr lang="en-US"/>
               <a:t>Fifth level</a:t>
             </a:r>
             <a:endParaRPr lang="en-CA"/>
@@ -7385,13 +7286,6 @@
   <p:clrMapOvr>
     <a:masterClrMapping/>
   </p:clrMapOvr>
-  <p:timing>
-    <p:tnLst>
-      <p:par>
-        <p:cTn id="1" dur="indefinite" restart="never" nodeType="tmRoot"/>
-      </p:par>
-    </p:tnLst>
-  </p:timing>
 </p:sldLayout>
 </file>
 
@@ -7437,7 +7331,7 @@
           </a:lstStyle>
           <a:p>
             <a:r>
-              <a:rPr lang="en-US" smtClean="0"/>
+              <a:rPr lang="en-US"/>
               <a:t>Click to edit Master title style</a:t>
             </a:r>
             <a:endParaRPr lang="en-CA"/>
@@ -7503,7 +7397,7 @@
           <a:p>
             <a:pPr lvl="0"/>
             <a:r>
-              <a:rPr lang="en-US" smtClean="0"/>
+              <a:rPr lang="en-US"/>
               <a:t>Click to edit Master text styles</a:t>
             </a:r>
           </a:p>
@@ -7559,35 +7453,35 @@
           <a:p>
             <a:pPr lvl="0"/>
             <a:r>
-              <a:rPr lang="en-US" smtClean="0"/>
+              <a:rPr lang="en-US"/>
               <a:t>Click to edit Master text styles</a:t>
             </a:r>
           </a:p>
           <a:p>
             <a:pPr lvl="1"/>
             <a:r>
-              <a:rPr lang="en-US" smtClean="0"/>
+              <a:rPr lang="en-US"/>
               <a:t>Second level</a:t>
             </a:r>
           </a:p>
           <a:p>
             <a:pPr lvl="2"/>
             <a:r>
-              <a:rPr lang="en-US" smtClean="0"/>
+              <a:rPr lang="en-US"/>
               <a:t>Third level</a:t>
             </a:r>
           </a:p>
           <a:p>
             <a:pPr lvl="3"/>
             <a:r>
-              <a:rPr lang="en-US" smtClean="0"/>
+              <a:rPr lang="en-US"/>
               <a:t>Fourth level</a:t>
             </a:r>
           </a:p>
           <a:p>
             <a:pPr lvl="4"/>
             <a:r>
-              <a:rPr lang="en-US" smtClean="0"/>
+              <a:rPr lang="en-US"/>
               <a:t>Fifth level</a:t>
             </a:r>
             <a:endParaRPr lang="en-CA"/>
@@ -7653,7 +7547,7 @@
           <a:p>
             <a:pPr lvl="0"/>
             <a:r>
-              <a:rPr lang="en-US" smtClean="0"/>
+              <a:rPr lang="en-US"/>
               <a:t>Click to edit Master text styles</a:t>
             </a:r>
           </a:p>
@@ -7709,35 +7603,35 @@
           <a:p>
             <a:pPr lvl="0"/>
             <a:r>
-              <a:rPr lang="en-US" smtClean="0"/>
+              <a:rPr lang="en-US"/>
               <a:t>Click to edit Master text styles</a:t>
             </a:r>
           </a:p>
           <a:p>
             <a:pPr lvl="1"/>
             <a:r>
-              <a:rPr lang="en-US" smtClean="0"/>
+              <a:rPr lang="en-US"/>
               <a:t>Second level</a:t>
             </a:r>
           </a:p>
           <a:p>
             <a:pPr lvl="2"/>
             <a:r>
-              <a:rPr lang="en-US" smtClean="0"/>
+              <a:rPr lang="en-US"/>
               <a:t>Third level</a:t>
             </a:r>
           </a:p>
           <a:p>
             <a:pPr lvl="3"/>
             <a:r>
-              <a:rPr lang="en-US" smtClean="0"/>
+              <a:rPr lang="en-US"/>
               <a:t>Fourth level</a:t>
             </a:r>
           </a:p>
           <a:p>
             <a:pPr lvl="4"/>
             <a:r>
-              <a:rPr lang="en-US" smtClean="0"/>
+              <a:rPr lang="en-US"/>
               <a:t>Fifth level</a:t>
             </a:r>
             <a:endParaRPr lang="en-CA"/>
@@ -7849,13 +7743,6 @@
   <p:clrMapOvr>
     <a:masterClrMapping/>
   </p:clrMapOvr>
-  <p:timing>
-    <p:tnLst>
-      <p:par>
-        <p:cTn id="1" dur="indefinite" restart="never" nodeType="tmRoot"/>
-      </p:par>
-    </p:tnLst>
-  </p:timing>
 </p:sldLayout>
 </file>
 
@@ -7892,7 +7779,7 @@
           <a:lstStyle/>
           <a:p>
             <a:r>
-              <a:rPr lang="en-US" smtClean="0"/>
+              <a:rPr lang="en-US"/>
               <a:t>Click to edit Master title style</a:t>
             </a:r>
             <a:endParaRPr lang="en-CA"/>
@@ -8004,13 +7891,6 @@
   <p:clrMapOvr>
     <a:masterClrMapping/>
   </p:clrMapOvr>
-  <p:timing>
-    <p:tnLst>
-      <p:par>
-        <p:cTn id="1" dur="indefinite" restart="never" nodeType="tmRoot"/>
-      </p:par>
-    </p:tnLst>
-  </p:timing>
 </p:sldLayout>
 </file>
 
@@ -8136,13 +8016,6 @@
   <p:clrMapOvr>
     <a:masterClrMapping/>
   </p:clrMapOvr>
-  <p:timing>
-    <p:tnLst>
-      <p:par>
-        <p:cTn id="1" dur="indefinite" restart="never" nodeType="tmRoot"/>
-      </p:par>
-    </p:tnLst>
-  </p:timing>
 </p:sldLayout>
 </file>
 
@@ -8188,7 +8061,7 @@
           </a:lstStyle>
           <a:p>
             <a:r>
-              <a:rPr lang="en-US" smtClean="0"/>
+              <a:rPr lang="en-US"/>
               <a:t>Click to edit Master title style</a:t>
             </a:r>
             <a:endParaRPr lang="en-CA"/>
@@ -8245,35 +8118,35 @@
           <a:p>
             <a:pPr lvl="0"/>
             <a:r>
-              <a:rPr lang="en-US" smtClean="0"/>
+              <a:rPr lang="en-US"/>
               <a:t>Click to edit Master text styles</a:t>
             </a:r>
           </a:p>
           <a:p>
             <a:pPr lvl="1"/>
             <a:r>
-              <a:rPr lang="en-US" smtClean="0"/>
+              <a:rPr lang="en-US"/>
               <a:t>Second level</a:t>
             </a:r>
           </a:p>
           <a:p>
             <a:pPr lvl="2"/>
             <a:r>
-              <a:rPr lang="en-US" smtClean="0"/>
+              <a:rPr lang="en-US"/>
               <a:t>Third level</a:t>
             </a:r>
           </a:p>
           <a:p>
             <a:pPr lvl="3"/>
             <a:r>
-              <a:rPr lang="en-US" smtClean="0"/>
+              <a:rPr lang="en-US"/>
               <a:t>Fourth level</a:t>
             </a:r>
           </a:p>
           <a:p>
             <a:pPr lvl="4"/>
             <a:r>
-              <a:rPr lang="en-US" smtClean="0"/>
+              <a:rPr lang="en-US"/>
               <a:t>Fifth level</a:t>
             </a:r>
             <a:endParaRPr lang="en-CA"/>
@@ -8339,7 +8212,7 @@
           <a:p>
             <a:pPr lvl="0"/>
             <a:r>
-              <a:rPr lang="en-US" smtClean="0"/>
+              <a:rPr lang="en-US"/>
               <a:t>Click to edit Master text styles</a:t>
             </a:r>
           </a:p>
@@ -8450,13 +8323,6 @@
   <p:clrMapOvr>
     <a:masterClrMapping/>
   </p:clrMapOvr>
-  <p:timing>
-    <p:tnLst>
-      <p:par>
-        <p:cTn id="1" dur="indefinite" restart="never" nodeType="tmRoot"/>
-      </p:par>
-    </p:tnLst>
-  </p:timing>
 </p:sldLayout>
 </file>
 
@@ -8502,7 +8368,7 @@
           </a:lstStyle>
           <a:p>
             <a:r>
-              <a:rPr lang="en-US" smtClean="0"/>
+              <a:rPr lang="en-US"/>
               <a:t>Click to edit Master title style</a:t>
             </a:r>
             <a:endParaRPr lang="en-CA"/>
@@ -8567,7 +8433,7 @@
           </a:lstStyle>
           <a:p>
             <a:r>
-              <a:rPr lang="en-US" smtClean="0"/>
+              <a:rPr lang="en-US"/>
               <a:t>Click icon to add picture</a:t>
             </a:r>
             <a:endParaRPr lang="en-CA"/>
@@ -8633,7 +8499,7 @@
           <a:p>
             <a:pPr lvl="0"/>
             <a:r>
-              <a:rPr lang="en-US" smtClean="0"/>
+              <a:rPr lang="en-US"/>
               <a:t>Click to edit Master text styles</a:t>
             </a:r>
           </a:p>
@@ -8744,13 +8610,6 @@
   <p:clrMapOvr>
     <a:masterClrMapping/>
   </p:clrMapOvr>
-  <p:timing>
-    <p:tnLst>
-      <p:par>
-        <p:cTn id="1" dur="indefinite" restart="never" nodeType="tmRoot"/>
-      </p:par>
-    </p:tnLst>
-  </p:timing>
 </p:sldLayout>
 </file>
 
@@ -8851,10 +8710,10 @@
           <a:p>
             <a:pPr lvl="0"/>
             <a:r>
-              <a:rPr lang="en-US" smtClean="0"/>
+              <a:rPr lang="en-US"/>
               <a:t>Click to edit Master title style</a:t>
             </a:r>
-            <a:endParaRPr lang="en-CA" dirty="0" smtClean="0"/>
+            <a:endParaRPr lang="en-CA" dirty="0"/>
           </a:p>
         </p:txBody>
       </p:sp>
@@ -8895,38 +8754,38 @@
           <a:p>
             <a:pPr lvl="0"/>
             <a:r>
-              <a:rPr lang="en-US" smtClean="0"/>
+              <a:rPr lang="en-US"/>
               <a:t>Click to edit Master text styles</a:t>
             </a:r>
           </a:p>
           <a:p>
             <a:pPr lvl="1"/>
             <a:r>
-              <a:rPr lang="en-US" smtClean="0"/>
+              <a:rPr lang="en-US"/>
               <a:t>Second level</a:t>
             </a:r>
           </a:p>
           <a:p>
             <a:pPr lvl="2"/>
             <a:r>
-              <a:rPr lang="en-US" smtClean="0"/>
+              <a:rPr lang="en-US"/>
               <a:t>Third level</a:t>
             </a:r>
           </a:p>
           <a:p>
             <a:pPr lvl="3"/>
             <a:r>
-              <a:rPr lang="en-US" smtClean="0"/>
+              <a:rPr lang="en-US"/>
               <a:t>Fourth level</a:t>
             </a:r>
           </a:p>
           <a:p>
             <a:pPr lvl="4"/>
             <a:r>
-              <a:rPr lang="en-US" smtClean="0"/>
+              <a:rPr lang="en-US"/>
               <a:t>Fifth level</a:t>
             </a:r>
-            <a:endParaRPr lang="en-CA" dirty="0" smtClean="0"/>
+            <a:endParaRPr lang="en-CA" dirty="0"/>
           </a:p>
         </p:txBody>
       </p:sp>
@@ -9149,13 +9008,6 @@
     <p:sldLayoutId id="2147483800" r:id="rId19"/>
     <p:sldLayoutId id="2147483656" r:id="rId20"/>
   </p:sldLayoutIdLst>
-  <p:timing>
-    <p:tnLst>
-      <p:par>
-        <p:cTn id="1" dur="indefinite" restart="never" nodeType="tmRoot"/>
-      </p:par>
-    </p:tnLst>
-  </p:timing>
   <p:hf hdr="0" ftr="0" dt="0"/>
   <p:txStyles>
     <p:titleStyle>
@@ -9581,10 +9433,9 @@
           <a:lstStyle/>
           <a:p>
             <a:r>
-              <a:rPr lang="en-US" smtClean="0"/>
+              <a:rPr lang="en-US"/>
               <a:t>Click to edit Master title style</a:t>
             </a:r>
-            <a:endParaRPr lang="en-US"/>
           </a:p>
         </p:txBody>
       </p:sp>
@@ -9615,38 +9466,37 @@
           <a:p>
             <a:pPr lvl="0"/>
             <a:r>
-              <a:rPr lang="en-US" smtClean="0"/>
+              <a:rPr lang="en-US"/>
               <a:t>Click to edit Master text styles</a:t>
             </a:r>
           </a:p>
           <a:p>
             <a:pPr lvl="1"/>
             <a:r>
-              <a:rPr lang="en-US" smtClean="0"/>
+              <a:rPr lang="en-US"/>
               <a:t>Second level</a:t>
             </a:r>
           </a:p>
           <a:p>
             <a:pPr lvl="2"/>
             <a:r>
-              <a:rPr lang="en-US" smtClean="0"/>
+              <a:rPr lang="en-US"/>
               <a:t>Third level</a:t>
             </a:r>
           </a:p>
           <a:p>
             <a:pPr lvl="3"/>
             <a:r>
-              <a:rPr lang="en-US" smtClean="0"/>
+              <a:rPr lang="en-US"/>
               <a:t>Fourth level</a:t>
             </a:r>
           </a:p>
           <a:p>
             <a:pPr lvl="4"/>
             <a:r>
-              <a:rPr lang="en-US" smtClean="0"/>
+              <a:rPr lang="en-US"/>
               <a:t>Fifth level</a:t>
             </a:r>
-            <a:endParaRPr lang="en-US"/>
           </a:p>
         </p:txBody>
       </p:sp>
@@ -10131,10 +9981,9 @@
           <a:p>
             <a:pPr algn="ctr"/>
             <a:r>
-              <a:rPr lang="en-US" sz="3000" dirty="0" smtClean="0"/>
+              <a:rPr lang="en-US" sz="3000" dirty="0"/>
               <a:t>TALK TITLE</a:t>
             </a:r>
-            <a:endParaRPr lang="en-US" sz="3000" dirty="0"/>
           </a:p>
         </p:txBody>
       </p:sp>
@@ -10162,18 +10011,16 @@
           <a:p>
             <a:pPr algn="ctr"/>
             <a:r>
-              <a:rPr lang="en-US" sz="2000" dirty="0" smtClean="0"/>
+              <a:rPr lang="en-US" sz="2000" dirty="0"/>
               <a:t>Author(s)</a:t>
             </a:r>
-            <a:endParaRPr lang="en-US" sz="2000" dirty="0"/>
           </a:p>
           <a:p>
             <a:pPr algn="ctr"/>
             <a:r>
-              <a:rPr lang="en-US" sz="2000" dirty="0" smtClean="0"/>
+              <a:rPr lang="en-US" sz="2000" dirty="0"/>
               <a:t>Date</a:t>
             </a:r>
-            <a:endParaRPr lang="en-US" sz="2000" dirty="0"/>
           </a:p>
         </p:txBody>
       </p:sp>
@@ -10195,13 +10042,6 @@
       <p:transition spd="slow" advTm="30839"/>
     </mc:Fallback>
   </mc:AlternateContent>
-  <p:timing>
-    <p:tnLst>
-      <p:par>
-        <p:cTn id="1" dur="indefinite" restart="never" nodeType="tmRoot"/>
-      </p:par>
-    </p:tnLst>
-  </p:timing>
 </p:sld>
 </file>
 
@@ -10262,10 +10102,9 @@
           <a:lstStyle/>
           <a:p>
             <a:r>
-              <a:rPr lang="en-US" sz="3000" dirty="0" smtClean="0"/>
+              <a:rPr lang="en-US" sz="3000" dirty="0"/>
               <a:t>Slide title</a:t>
             </a:r>
-            <a:endParaRPr lang="en-US" sz="3000" dirty="0"/>
           </a:p>
         </p:txBody>
       </p:sp>
@@ -10302,13 +10141,6 @@
   <p:clrMapOvr>
     <a:masterClrMapping/>
   </p:clrMapOvr>
-  <p:timing>
-    <p:tnLst>
-      <p:par>
-        <p:cTn id="1" dur="indefinite" restart="never" nodeType="tmRoot"/>
-      </p:par>
-    </p:tnLst>
-  </p:timing>
 </p:sld>
 </file>
 
@@ -10345,10 +10177,9 @@
           <a:lstStyle/>
           <a:p>
             <a:r>
-              <a:rPr lang="en-US" sz="3000" dirty="0" smtClean="0"/>
+              <a:rPr lang="en-US" sz="3000" dirty="0"/>
               <a:t>Acknowledgements</a:t>
             </a:r>
-            <a:endParaRPr lang="en-US" sz="3000" dirty="0"/>
           </a:p>
         </p:txBody>
       </p:sp>
@@ -10416,323 +10247,293 @@
           </a:extLst>
         </p:spPr>
       </p:pic>
-      <p:grpSp>
-        <p:nvGrpSpPr>
-          <p:cNvPr id="7" name="Group 6"/>
-          <p:cNvGrpSpPr/>
+      <p:pic>
+        <p:nvPicPr>
+          <p:cNvPr id="2060" name="Picture 12" descr="http://cfmm.robarts.ca/wp-content/uploads/2013/03/Functional_Metabolic_Mapping_RGB1.jpg"/>
+          <p:cNvPicPr>
+            <a:picLocks noChangeAspect="1" noChangeArrowheads="1"/>
+          </p:cNvPicPr>
           <p:nvPr/>
-        </p:nvGrpSpPr>
-        <p:grpSpPr>
-          <a:xfrm>
-            <a:off x="2197238" y="5324084"/>
-            <a:ext cx="7797524" cy="1255691"/>
-            <a:chOff x="1481070" y="4974834"/>
-            <a:chExt cx="7797524" cy="1255691"/>
-          </a:xfrm>
-        </p:grpSpPr>
-        <p:pic>
-          <p:nvPicPr>
-            <p:cNvPr id="2060" name="Picture 12" descr="http://cfmm.robarts.ca/wp-content/uploads/2013/03/Functional_Metabolic_Mapping_RGB1.jpg"/>
-            <p:cNvPicPr>
-              <a:picLocks noChangeAspect="1" noChangeArrowheads="1"/>
-            </p:cNvPicPr>
-            <p:nvPr/>
-          </p:nvPicPr>
-          <p:blipFill>
-            <a:blip r:embed="rId4">
-              <a:extLst>
-                <a:ext uri="{28A0092B-C50C-407E-A947-70E740481C1C}">
-                  <a14:useLocalDpi xmlns:a14="http://schemas.microsoft.com/office/drawing/2010/main" val="0"/>
-                </a:ext>
-              </a:extLst>
-            </a:blip>
-            <a:srcRect/>
-            <a:stretch>
-              <a:fillRect/>
-            </a:stretch>
-          </p:blipFill>
-          <p:spPr bwMode="auto">
-            <a:xfrm>
-              <a:off x="6553453" y="4974834"/>
-              <a:ext cx="1616539" cy="498541"/>
-            </a:xfrm>
-            <a:prstGeom prst="rect">
-              <a:avLst/>
-            </a:prstGeom>
-            <a:noFill/>
+        </p:nvPicPr>
+        <p:blipFill>
+          <a:blip r:embed="rId4">
             <a:extLst>
-              <a:ext uri="{909E8E84-426E-40DD-AFC4-6F175D3DCCD1}">
-                <a14:hiddenFill xmlns:a14="http://schemas.microsoft.com/office/drawing/2010/main">
-                  <a:solidFill>
-                    <a:srgbClr val="FFFFFF"/>
-                  </a:solidFill>
-                </a14:hiddenFill>
+              <a:ext uri="{28A0092B-C50C-407E-A947-70E740481C1C}">
+                <a14:useLocalDpi xmlns:a14="http://schemas.microsoft.com/office/drawing/2010/main" val="0"/>
               </a:ext>
             </a:extLst>
-          </p:spPr>
-        </p:pic>
-        <p:pic>
-          <p:nvPicPr>
-            <p:cNvPr id="2052" name="Picture 4" descr="BrainsCAN.png"/>
-            <p:cNvPicPr>
-              <a:picLocks noChangeAspect="1" noChangeArrowheads="1"/>
-            </p:cNvPicPr>
-            <p:nvPr/>
-          </p:nvPicPr>
-          <p:blipFill>
-            <a:blip r:embed="rId5">
-              <a:extLst>
-                <a:ext uri="{28A0092B-C50C-407E-A947-70E740481C1C}">
-                  <a14:useLocalDpi xmlns:a14="http://schemas.microsoft.com/office/drawing/2010/main" val="0"/>
-                </a:ext>
-              </a:extLst>
-            </a:blip>
-            <a:srcRect/>
-            <a:stretch>
-              <a:fillRect/>
-            </a:stretch>
-          </p:blipFill>
-          <p:spPr bwMode="auto">
-            <a:xfrm>
-              <a:off x="3780856" y="4974835"/>
-              <a:ext cx="1617614" cy="498541"/>
-            </a:xfrm>
-            <a:prstGeom prst="rect">
-              <a:avLst/>
-            </a:prstGeom>
-            <a:noFill/>
+          </a:blip>
+          <a:srcRect/>
+          <a:stretch>
+            <a:fillRect/>
+          </a:stretch>
+        </p:blipFill>
+        <p:spPr bwMode="auto">
+          <a:xfrm>
+            <a:off x="7269621" y="5324084"/>
+            <a:ext cx="1616539" cy="498541"/>
+          </a:xfrm>
+          <a:prstGeom prst="rect">
+            <a:avLst/>
+          </a:prstGeom>
+          <a:noFill/>
+          <a:extLst>
+            <a:ext uri="{909E8E84-426E-40DD-AFC4-6F175D3DCCD1}">
+              <a14:hiddenFill xmlns:a14="http://schemas.microsoft.com/office/drawing/2010/main">
+                <a:solidFill>
+                  <a:srgbClr val="FFFFFF"/>
+                </a:solidFill>
+              </a14:hiddenFill>
+            </a:ext>
+          </a:extLst>
+        </p:spPr>
+      </p:pic>
+      <p:pic>
+        <p:nvPicPr>
+          <p:cNvPr id="2052" name="Picture 4" descr="BrainsCAN.png"/>
+          <p:cNvPicPr>
+            <a:picLocks noChangeAspect="1" noChangeArrowheads="1"/>
+          </p:cNvPicPr>
+          <p:nvPr/>
+        </p:nvPicPr>
+        <p:blipFill>
+          <a:blip r:embed="rId5">
             <a:extLst>
-              <a:ext uri="{909E8E84-426E-40DD-AFC4-6F175D3DCCD1}">
-                <a14:hiddenFill xmlns:a14="http://schemas.microsoft.com/office/drawing/2010/main">
-                  <a:solidFill>
-                    <a:srgbClr val="FFFFFF"/>
-                  </a:solidFill>
-                </a14:hiddenFill>
+              <a:ext uri="{28A0092B-C50C-407E-A947-70E740481C1C}">
+                <a14:useLocalDpi xmlns:a14="http://schemas.microsoft.com/office/drawing/2010/main" val="0"/>
               </a:ext>
             </a:extLst>
-          </p:spPr>
-        </p:pic>
-        <p:grpSp>
-          <p:nvGrpSpPr>
-            <p:cNvPr id="5" name="Group 4"/>
-            <p:cNvGrpSpPr/>
-            <p:nvPr/>
-          </p:nvGrpSpPr>
-          <p:grpSpPr>
-            <a:xfrm>
-              <a:off x="1481070" y="5571890"/>
-              <a:ext cx="7797524" cy="658635"/>
-              <a:chOff x="2490423" y="5571890"/>
-              <a:chExt cx="7797524" cy="658635"/>
-            </a:xfrm>
-          </p:grpSpPr>
-          <p:pic>
-            <p:nvPicPr>
-              <p:cNvPr id="2054" name="Picture 6" descr="Eplink.png"/>
-              <p:cNvPicPr>
-                <a:picLocks noChangeAspect="1" noChangeArrowheads="1"/>
-              </p:cNvPicPr>
-              <p:nvPr/>
-            </p:nvPicPr>
-            <p:blipFill>
-              <a:blip r:embed="rId6">
-                <a:extLst>
-                  <a:ext uri="{28A0092B-C50C-407E-A947-70E740481C1C}">
-                    <a14:useLocalDpi xmlns:a14="http://schemas.microsoft.com/office/drawing/2010/main" val="0"/>
-                  </a:ext>
-                </a:extLst>
-              </a:blip>
-              <a:srcRect/>
-              <a:stretch>
-                <a:fillRect/>
-              </a:stretch>
-            </p:blipFill>
-            <p:spPr bwMode="auto">
-              <a:xfrm>
-                <a:off x="4790209" y="5571925"/>
-                <a:ext cx="851290" cy="601997"/>
-              </a:xfrm>
-              <a:prstGeom prst="rect">
-                <a:avLst/>
-              </a:prstGeom>
-              <a:noFill/>
-              <a:extLst>
-                <a:ext uri="{909E8E84-426E-40DD-AFC4-6F175D3DCCD1}">
-                  <a14:hiddenFill xmlns:a14="http://schemas.microsoft.com/office/drawing/2010/main">
-                    <a:solidFill>
-                      <a:srgbClr val="FFFFFF"/>
-                    </a:solidFill>
-                  </a14:hiddenFill>
-                </a:ext>
-              </a:extLst>
-            </p:spPr>
-          </p:pic>
-          <p:pic>
-            <p:nvPicPr>
-              <p:cNvPr id="2056" name="Picture 8" descr="BrainCanada.png"/>
-              <p:cNvPicPr>
-                <a:picLocks noChangeAspect="1" noChangeArrowheads="1"/>
-              </p:cNvPicPr>
-              <p:nvPr/>
-            </p:nvPicPr>
-            <p:blipFill>
-              <a:blip r:embed="rId7">
-                <a:extLst>
-                  <a:ext uri="{28A0092B-C50C-407E-A947-70E740481C1C}">
-                    <a14:useLocalDpi xmlns:a14="http://schemas.microsoft.com/office/drawing/2010/main" val="0"/>
-                  </a:ext>
-                </a:extLst>
-              </a:blip>
-              <a:srcRect/>
-              <a:stretch>
-                <a:fillRect/>
-              </a:stretch>
-            </p:blipFill>
-            <p:spPr bwMode="auto">
-              <a:xfrm>
-                <a:off x="5811062" y="5614528"/>
-                <a:ext cx="1957873" cy="559393"/>
-              </a:xfrm>
-              <a:prstGeom prst="rect">
-                <a:avLst/>
-              </a:prstGeom>
-              <a:noFill/>
-              <a:extLst>
-                <a:ext uri="{909E8E84-426E-40DD-AFC4-6F175D3DCCD1}">
-                  <a14:hiddenFill xmlns:a14="http://schemas.microsoft.com/office/drawing/2010/main">
-                    <a:solidFill>
-                      <a:srgbClr val="FFFFFF"/>
-                    </a:solidFill>
-                  </a14:hiddenFill>
-                </a:ext>
-              </a:extLst>
-            </p:spPr>
-          </p:pic>
-          <p:pic>
-            <p:nvPicPr>
-              <p:cNvPr id="2058" name="Picture 10" descr="OBI.jpg"/>
-              <p:cNvPicPr>
-                <a:picLocks noChangeAspect="1" noChangeArrowheads="1"/>
-              </p:cNvPicPr>
-              <p:nvPr/>
-            </p:nvPicPr>
-            <p:blipFill>
-              <a:blip r:embed="rId8">
-                <a:extLst>
-                  <a:ext uri="{28A0092B-C50C-407E-A947-70E740481C1C}">
-                    <a14:useLocalDpi xmlns:a14="http://schemas.microsoft.com/office/drawing/2010/main" val="0"/>
-                  </a:ext>
-                </a:extLst>
-              </a:blip>
-              <a:srcRect/>
-              <a:stretch>
-                <a:fillRect/>
-              </a:stretch>
-            </p:blipFill>
-            <p:spPr bwMode="auto">
-              <a:xfrm>
-                <a:off x="2490423" y="5667375"/>
-                <a:ext cx="2158594" cy="506546"/>
-              </a:xfrm>
-              <a:prstGeom prst="rect">
-                <a:avLst/>
-              </a:prstGeom>
-              <a:noFill/>
-              <a:extLst>
-                <a:ext uri="{909E8E84-426E-40DD-AFC4-6F175D3DCCD1}">
-                  <a14:hiddenFill xmlns:a14="http://schemas.microsoft.com/office/drawing/2010/main">
-                    <a:solidFill>
-                      <a:srgbClr val="FFFFFF"/>
-                    </a:solidFill>
-                  </a14:hiddenFill>
-                </a:ext>
-              </a:extLst>
-            </p:spPr>
-          </p:pic>
-          <p:pic>
-            <p:nvPicPr>
-              <p:cNvPr id="14" name="Picture 14" descr="CIHR's leaf identifier - full-colour"/>
-              <p:cNvPicPr>
-                <a:picLocks noChangeAspect="1" noChangeArrowheads="1"/>
-              </p:cNvPicPr>
-              <p:nvPr/>
-            </p:nvPicPr>
-            <p:blipFill>
-              <a:blip r:embed="rId9">
-                <a:extLst>
-                  <a:ext uri="{28A0092B-C50C-407E-A947-70E740481C1C}">
-                    <a14:useLocalDpi xmlns:a14="http://schemas.microsoft.com/office/drawing/2010/main" val="0"/>
-                  </a:ext>
-                </a:extLst>
-              </a:blip>
-              <a:srcRect/>
-              <a:stretch>
-                <a:fillRect/>
-              </a:stretch>
-            </p:blipFill>
-            <p:spPr bwMode="auto">
-              <a:xfrm>
-                <a:off x="9265802" y="5572463"/>
-                <a:ext cx="1022145" cy="657488"/>
-              </a:xfrm>
-              <a:prstGeom prst="rect">
-                <a:avLst/>
-              </a:prstGeom>
-              <a:noFill/>
-              <a:extLst>
-                <a:ext uri="{909E8E84-426E-40DD-AFC4-6F175D3DCCD1}">
-                  <a14:hiddenFill xmlns:a14="http://schemas.microsoft.com/office/drawing/2010/main">
-                    <a:solidFill>
-                      <a:srgbClr val="FFFFFF"/>
-                    </a:solidFill>
-                  </a14:hiddenFill>
-                </a:ext>
-              </a:extLst>
-            </p:spPr>
-          </p:pic>
-          <p:pic>
-            <p:nvPicPr>
-              <p:cNvPr id="15" name="Picture 18" descr="http://www.nserc-crsng.gc.ca/_img/logos/NSERC_C.jpg"/>
-              <p:cNvPicPr>
-                <a:picLocks noChangeAspect="1" noChangeArrowheads="1"/>
-              </p:cNvPicPr>
-              <p:nvPr/>
-            </p:nvPicPr>
-            <p:blipFill>
-              <a:blip r:embed="rId10">
-                <a:extLst>
-                  <a:ext uri="{28A0092B-C50C-407E-A947-70E740481C1C}">
-                    <a14:useLocalDpi xmlns:a14="http://schemas.microsoft.com/office/drawing/2010/main" val="0"/>
-                  </a:ext>
-                </a:extLst>
-              </a:blip>
-              <a:srcRect/>
-              <a:stretch>
-                <a:fillRect/>
-              </a:stretch>
-            </p:blipFill>
-            <p:spPr bwMode="auto">
-              <a:xfrm>
-                <a:off x="7862076" y="5571890"/>
-                <a:ext cx="1317269" cy="658635"/>
-              </a:xfrm>
-              <a:prstGeom prst="rect">
-                <a:avLst/>
-              </a:prstGeom>
-              <a:noFill/>
-              <a:extLst>
-                <a:ext uri="{909E8E84-426E-40DD-AFC4-6F175D3DCCD1}">
-                  <a14:hiddenFill xmlns:a14="http://schemas.microsoft.com/office/drawing/2010/main">
-                    <a:solidFill>
-                      <a:srgbClr val="FFFFFF"/>
-                    </a:solidFill>
-                  </a14:hiddenFill>
-                </a:ext>
-              </a:extLst>
-            </p:spPr>
-          </p:pic>
-        </p:grpSp>
-      </p:grpSp>
+          </a:blip>
+          <a:srcRect/>
+          <a:stretch>
+            <a:fillRect/>
+          </a:stretch>
+        </p:blipFill>
+        <p:spPr bwMode="auto">
+          <a:xfrm>
+            <a:off x="4497024" y="5324085"/>
+            <a:ext cx="1617614" cy="498541"/>
+          </a:xfrm>
+          <a:prstGeom prst="rect">
+            <a:avLst/>
+          </a:prstGeom>
+          <a:noFill/>
+          <a:extLst>
+            <a:ext uri="{909E8E84-426E-40DD-AFC4-6F175D3DCCD1}">
+              <a14:hiddenFill xmlns:a14="http://schemas.microsoft.com/office/drawing/2010/main">
+                <a:solidFill>
+                  <a:srgbClr val="FFFFFF"/>
+                </a:solidFill>
+              </a14:hiddenFill>
+            </a:ext>
+          </a:extLst>
+        </p:spPr>
+      </p:pic>
+      <p:pic>
+        <p:nvPicPr>
+          <p:cNvPr id="2054" name="Picture 6" descr="Eplink.png"/>
+          <p:cNvPicPr>
+            <a:picLocks noChangeAspect="1" noChangeArrowheads="1"/>
+          </p:cNvPicPr>
+          <p:nvPr/>
+        </p:nvPicPr>
+        <p:blipFill>
+          <a:blip r:embed="rId6">
+            <a:extLst>
+              <a:ext uri="{28A0092B-C50C-407E-A947-70E740481C1C}">
+                <a14:useLocalDpi xmlns:a14="http://schemas.microsoft.com/office/drawing/2010/main" val="0"/>
+              </a:ext>
+            </a:extLst>
+          </a:blip>
+          <a:srcRect/>
+          <a:stretch>
+            <a:fillRect/>
+          </a:stretch>
+        </p:blipFill>
+        <p:spPr bwMode="auto">
+          <a:xfrm>
+            <a:off x="4497024" y="5921175"/>
+            <a:ext cx="851290" cy="601997"/>
+          </a:xfrm>
+          <a:prstGeom prst="rect">
+            <a:avLst/>
+          </a:prstGeom>
+          <a:noFill/>
+          <a:extLst>
+            <a:ext uri="{909E8E84-426E-40DD-AFC4-6F175D3DCCD1}">
+              <a14:hiddenFill xmlns:a14="http://schemas.microsoft.com/office/drawing/2010/main">
+                <a:solidFill>
+                  <a:srgbClr val="FFFFFF"/>
+                </a:solidFill>
+              </a14:hiddenFill>
+            </a:ext>
+          </a:extLst>
+        </p:spPr>
+      </p:pic>
+      <p:pic>
+        <p:nvPicPr>
+          <p:cNvPr id="2056" name="Picture 8" descr="BrainCanada.png"/>
+          <p:cNvPicPr>
+            <a:picLocks noChangeAspect="1" noChangeArrowheads="1"/>
+          </p:cNvPicPr>
+          <p:nvPr/>
+        </p:nvPicPr>
+        <p:blipFill>
+          <a:blip r:embed="rId7">
+            <a:extLst>
+              <a:ext uri="{28A0092B-C50C-407E-A947-70E740481C1C}">
+                <a14:useLocalDpi xmlns:a14="http://schemas.microsoft.com/office/drawing/2010/main" val="0"/>
+              </a:ext>
+            </a:extLst>
+          </a:blip>
+          <a:srcRect/>
+          <a:stretch>
+            <a:fillRect/>
+          </a:stretch>
+        </p:blipFill>
+        <p:spPr bwMode="auto">
+          <a:xfrm>
+            <a:off x="5517877" y="5963778"/>
+            <a:ext cx="1957873" cy="559393"/>
+          </a:xfrm>
+          <a:prstGeom prst="rect">
+            <a:avLst/>
+          </a:prstGeom>
+          <a:noFill/>
+          <a:extLst>
+            <a:ext uri="{909E8E84-426E-40DD-AFC4-6F175D3DCCD1}">
+              <a14:hiddenFill xmlns:a14="http://schemas.microsoft.com/office/drawing/2010/main">
+                <a:solidFill>
+                  <a:srgbClr val="FFFFFF"/>
+                </a:solidFill>
+              </a14:hiddenFill>
+            </a:ext>
+          </a:extLst>
+        </p:spPr>
+      </p:pic>
+      <p:pic>
+        <p:nvPicPr>
+          <p:cNvPr id="2058" name="Picture 10" descr="OBI.jpg"/>
+          <p:cNvPicPr>
+            <a:picLocks noChangeAspect="1" noChangeArrowheads="1"/>
+          </p:cNvPicPr>
+          <p:nvPr/>
+        </p:nvPicPr>
+        <p:blipFill>
+          <a:blip r:embed="rId8">
+            <a:extLst>
+              <a:ext uri="{28A0092B-C50C-407E-A947-70E740481C1C}">
+                <a14:useLocalDpi xmlns:a14="http://schemas.microsoft.com/office/drawing/2010/main" val="0"/>
+              </a:ext>
+            </a:extLst>
+          </a:blip>
+          <a:srcRect/>
+          <a:stretch>
+            <a:fillRect/>
+          </a:stretch>
+        </p:blipFill>
+        <p:spPr bwMode="auto">
+          <a:xfrm>
+            <a:off x="2197238" y="6016625"/>
+            <a:ext cx="2158594" cy="506546"/>
+          </a:xfrm>
+          <a:prstGeom prst="rect">
+            <a:avLst/>
+          </a:prstGeom>
+          <a:noFill/>
+          <a:extLst>
+            <a:ext uri="{909E8E84-426E-40DD-AFC4-6F175D3DCCD1}">
+              <a14:hiddenFill xmlns:a14="http://schemas.microsoft.com/office/drawing/2010/main">
+                <a:solidFill>
+                  <a:srgbClr val="FFFFFF"/>
+                </a:solidFill>
+              </a14:hiddenFill>
+            </a:ext>
+          </a:extLst>
+        </p:spPr>
+      </p:pic>
+      <p:pic>
+        <p:nvPicPr>
+          <p:cNvPr id="14" name="Picture 14" descr="CIHR's leaf identifier - full-colour"/>
+          <p:cNvPicPr>
+            <a:picLocks noChangeAspect="1" noChangeArrowheads="1"/>
+          </p:cNvPicPr>
+          <p:nvPr/>
+        </p:nvPicPr>
+        <p:blipFill>
+          <a:blip r:embed="rId9">
+            <a:extLst>
+              <a:ext uri="{28A0092B-C50C-407E-A947-70E740481C1C}">
+                <a14:useLocalDpi xmlns:a14="http://schemas.microsoft.com/office/drawing/2010/main" val="0"/>
+              </a:ext>
+            </a:extLst>
+          </a:blip>
+          <a:srcRect/>
+          <a:stretch>
+            <a:fillRect/>
+          </a:stretch>
+        </p:blipFill>
+        <p:spPr bwMode="auto">
+          <a:xfrm>
+            <a:off x="8972617" y="5921713"/>
+            <a:ext cx="1022145" cy="657488"/>
+          </a:xfrm>
+          <a:prstGeom prst="rect">
+            <a:avLst/>
+          </a:prstGeom>
+          <a:noFill/>
+          <a:extLst>
+            <a:ext uri="{909E8E84-426E-40DD-AFC4-6F175D3DCCD1}">
+              <a14:hiddenFill xmlns:a14="http://schemas.microsoft.com/office/drawing/2010/main">
+                <a:solidFill>
+                  <a:srgbClr val="FFFFFF"/>
+                </a:solidFill>
+              </a14:hiddenFill>
+            </a:ext>
+          </a:extLst>
+        </p:spPr>
+      </p:pic>
+      <p:pic>
+        <p:nvPicPr>
+          <p:cNvPr id="15" name="Picture 18" descr="http://www.nserc-crsng.gc.ca/_img/logos/NSERC_C.jpg"/>
+          <p:cNvPicPr>
+            <a:picLocks noChangeAspect="1" noChangeArrowheads="1"/>
+          </p:cNvPicPr>
+          <p:nvPr/>
+        </p:nvPicPr>
+        <p:blipFill>
+          <a:blip r:embed="rId10">
+            <a:extLst>
+              <a:ext uri="{28A0092B-C50C-407E-A947-70E740481C1C}">
+                <a14:useLocalDpi xmlns:a14="http://schemas.microsoft.com/office/drawing/2010/main" val="0"/>
+              </a:ext>
+            </a:extLst>
+          </a:blip>
+          <a:srcRect/>
+          <a:stretch>
+            <a:fillRect/>
+          </a:stretch>
+        </p:blipFill>
+        <p:spPr bwMode="auto">
+          <a:xfrm>
+            <a:off x="7568891" y="5921140"/>
+            <a:ext cx="1317269" cy="658635"/>
+          </a:xfrm>
+          <a:prstGeom prst="rect">
+            <a:avLst/>
+          </a:prstGeom>
+          <a:noFill/>
+          <a:extLst>
+            <a:ext uri="{909E8E84-426E-40DD-AFC4-6F175D3DCCD1}">
+              <a14:hiddenFill xmlns:a14="http://schemas.microsoft.com/office/drawing/2010/main">
+                <a:solidFill>
+                  <a:srgbClr val="FFFFFF"/>
+                </a:solidFill>
+              </a14:hiddenFill>
+            </a:ext>
+          </a:extLst>
+        </p:spPr>
+      </p:pic>
       <p:sp>
         <p:nvSpPr>
           <p:cNvPr id="8" name="Content Placeholder 7"/>
@@ -10765,13 +10566,6 @@
   <p:clrMapOvr>
     <a:masterClrMapping/>
   </p:clrMapOvr>
-  <p:timing>
-    <p:tnLst>
-      <p:par>
-        <p:cTn id="1" dur="indefinite" restart="never" nodeType="tmRoot"/>
-      </p:par>
-    </p:tnLst>
-  </p:timing>
 </p:sld>
 </file>
 

</xml_diff>